<commit_message>
Updated version of nlp2
Made some small edits -- fixed typos added sources, etc.
</commit_message>
<xml_diff>
--- a/NLP 2/nlp2.pptx
+++ b/NLP 2/nlp2.pptx
@@ -5,7 +5,7 @@
     <p:sldMasterId id="2147483648" r:id="rId1"/>
   </p:sldMasterIdLst>
   <p:notesMasterIdLst>
-    <p:notesMasterId r:id="rId37"/>
+    <p:notesMasterId r:id="rId38"/>
   </p:notesMasterIdLst>
   <p:sldIdLst>
     <p:sldId id="256" r:id="rId2"/>
@@ -43,6 +43,7 @@
     <p:sldId id="275" r:id="rId34"/>
     <p:sldId id="276" r:id="rId35"/>
     <p:sldId id="292" r:id="rId36"/>
+    <p:sldId id="296" r:id="rId37"/>
   </p:sldIdLst>
   <p:sldSz cx="12192000" cy="6858000"/>
   <p:notesSz cx="6858000" cy="9144000"/>
@@ -280,7 +281,7 @@
       <p15:sldGuideLst xmlns:p15="http://schemas.microsoft.com/office/powerpoint/2012/main"/>
     </p:ext>
     <p:ext uri="http://customooxmlschemas.google.com/">
-      <go:slidesCustomData xmlns="" xmlns:mc="http://schemas.openxmlformats.org/markup-compatibility/2006" xmlns:mv="urn:schemas-microsoft-com:mac:vml" xmlns:c="http://schemas.openxmlformats.org/drawingml/2006/chart" xmlns:dgm="http://schemas.openxmlformats.org/drawingml/2006/diagram" xmlns:o="urn:schemas-microsoft-com:office:office" xmlns:v="urn:schemas-microsoft-com:vml" xmlns:pvml="urn:schemas-microsoft-com:office:powerpoint" xmlns:com="http://schemas.openxmlformats.org/drawingml/2006/compatibility" xmlns:p14="http://schemas.microsoft.com/office/powerpoint/2010/main" xmlns:p15="http://schemas.microsoft.com/office/powerpoint/2012/main" xmlns:go="http://customooxmlschemas.google.com/" r:id="rId38" roundtripDataSignature="AMtx7mhI1KXnveFr8H4cdlrO4sf01GcE8w=="/>
+      <go:slidesCustomData xmlns:go="http://customooxmlschemas.google.com/" xmlns:p15="http://schemas.microsoft.com/office/powerpoint/2012/main" xmlns:p14="http://schemas.microsoft.com/office/powerpoint/2010/main" xmlns:com="http://schemas.openxmlformats.org/drawingml/2006/compatibility" xmlns:pvml="urn:schemas-microsoft-com:office:powerpoint" xmlns:v="urn:schemas-microsoft-com:vml" xmlns:o="urn:schemas-microsoft-com:office:office" xmlns:dgm="http://schemas.openxmlformats.org/drawingml/2006/diagram" xmlns:c="http://schemas.openxmlformats.org/drawingml/2006/chart" xmlns:mv="urn:schemas-microsoft-com:mac:vml" xmlns:mc="http://schemas.openxmlformats.org/markup-compatibility/2006" xmlns="" r:id="rId39" roundtripDataSignature="AMtx7mhI1KXnveFr8H4cdlrO4sf01GcE8w=="/>
     </p:ext>
   </p:extLst>
 </p:presentation>
@@ -24500,7 +24501,7 @@
         </p:blipFill>
         <p:spPr>
           <a:xfrm>
-            <a:off x="5100755" y="467208"/>
+            <a:off x="5100754" y="88994"/>
             <a:ext cx="6029094" cy="5923584"/>
           </a:xfrm>
           <a:prstGeom prst="rect">
@@ -24508,6 +24509,41 @@
           </a:prstGeom>
         </p:spPr>
       </p:pic>
+      <p:sp>
+        <p:nvSpPr>
+          <p:cNvPr id="3" name="TextBox 2">
+            <a:extLst>
+              <a:ext uri="{FF2B5EF4-FFF2-40B4-BE49-F238E27FC236}">
+                <a16:creationId xmlns:a16="http://schemas.microsoft.com/office/drawing/2014/main" id="{F2F69F77-94A9-4008-9FDA-ECB6D5EE777D}"/>
+              </a:ext>
+            </a:extLst>
+          </p:cNvPr>
+          <p:cNvSpPr txBox="1"/>
+          <p:nvPr/>
+        </p:nvSpPr>
+        <p:spPr>
+          <a:xfrm>
+            <a:off x="4274443" y="6141705"/>
+            <a:ext cx="7753634" cy="523220"/>
+          </a:xfrm>
+          <a:prstGeom prst="rect">
+            <a:avLst/>
+          </a:prstGeom>
+          <a:noFill/>
+        </p:spPr>
+        <p:txBody>
+          <a:bodyPr wrap="square" rtlCol="0">
+            <a:spAutoFit/>
+          </a:bodyPr>
+          <a:lstStyle/>
+          <a:p>
+            <a:r>
+              <a:rPr lang="en-US" dirty="0"/>
+              <a:t>Source: https://medium.com/sciforce/a-comprehensive-guide-to-natural-language-generation-dd63a4b6e548</a:t>
+            </a:r>
+          </a:p>
+        </p:txBody>
+      </p:sp>
     </p:spTree>
     <p:extLst>
       <p:ext uri="{BB962C8B-B14F-4D97-AF65-F5344CB8AC3E}">
@@ -25661,6 +25697,92 @@
     <p:extLst>
       <p:ext uri="{BB962C8B-B14F-4D97-AF65-F5344CB8AC3E}">
         <p14:creationId xmlns:p14="http://schemas.microsoft.com/office/powerpoint/2010/main" val="2709712633"/>
+      </p:ext>
+    </p:extLst>
+  </p:cSld>
+  <p:clrMapOvr>
+    <a:masterClrMapping/>
+  </p:clrMapOvr>
+</p:sld>
+</file>
+
+<file path=ppt/slides/slide36.xml><?xml version="1.0" encoding="utf-8"?>
+<p:sld xmlns:a="http://schemas.openxmlformats.org/drawingml/2006/main" xmlns:r="http://schemas.openxmlformats.org/officeDocument/2006/relationships" xmlns:p="http://schemas.openxmlformats.org/presentationml/2006/main">
+  <p:cSld>
+    <p:spTree>
+      <p:nvGrpSpPr>
+        <p:cNvPr id="1" name=""/>
+        <p:cNvGrpSpPr/>
+        <p:nvPr/>
+      </p:nvGrpSpPr>
+      <p:grpSpPr>
+        <a:xfrm>
+          <a:off x="0" y="0"/>
+          <a:ext cx="0" cy="0"/>
+          <a:chOff x="0" y="0"/>
+          <a:chExt cx="0" cy="0"/>
+        </a:xfrm>
+      </p:grpSpPr>
+      <p:sp>
+        <p:nvSpPr>
+          <p:cNvPr id="2" name="Title 1">
+            <a:extLst>
+              <a:ext uri="{FF2B5EF4-FFF2-40B4-BE49-F238E27FC236}">
+                <a16:creationId xmlns:a16="http://schemas.microsoft.com/office/drawing/2014/main" id="{8C094B87-1171-4035-8360-625F5E89E879}"/>
+              </a:ext>
+            </a:extLst>
+          </p:cNvPr>
+          <p:cNvSpPr>
+            <a:spLocks noGrp="1"/>
+          </p:cNvSpPr>
+          <p:nvPr>
+            <p:ph type="ctrTitle"/>
+          </p:nvPr>
+        </p:nvSpPr>
+        <p:spPr/>
+        <p:txBody>
+          <a:bodyPr/>
+          <a:lstStyle/>
+          <a:p>
+            <a:r>
+              <a:rPr lang="en-US" dirty="0"/>
+              <a:t>Thank you!</a:t>
+            </a:r>
+          </a:p>
+        </p:txBody>
+      </p:sp>
+      <p:sp>
+        <p:nvSpPr>
+          <p:cNvPr id="3" name="Subtitle 2">
+            <a:extLst>
+              <a:ext uri="{FF2B5EF4-FFF2-40B4-BE49-F238E27FC236}">
+                <a16:creationId xmlns:a16="http://schemas.microsoft.com/office/drawing/2014/main" id="{25FA2B1F-12B5-48CB-837F-01561A32A300}"/>
+              </a:ext>
+            </a:extLst>
+          </p:cNvPr>
+          <p:cNvSpPr>
+            <a:spLocks noGrp="1"/>
+          </p:cNvSpPr>
+          <p:nvPr>
+            <p:ph type="subTitle" idx="1"/>
+          </p:nvPr>
+        </p:nvSpPr>
+        <p:spPr/>
+        <p:txBody>
+          <a:bodyPr/>
+          <a:lstStyle/>
+          <a:p>
+            <a:r>
+              <a:rPr lang="en-US" dirty="0"/>
+              <a:t>Questions? Comments?</a:t>
+            </a:r>
+          </a:p>
+        </p:txBody>
+      </p:sp>
+    </p:spTree>
+    <p:extLst>
+      <p:ext uri="{BB962C8B-B14F-4D97-AF65-F5344CB8AC3E}">
+        <p14:creationId xmlns:p14="http://schemas.microsoft.com/office/powerpoint/2010/main" val="114594333"/>
       </p:ext>
     </p:extLst>
   </p:cSld>
@@ -27461,328 +27583,531 @@
           </a:p>
         </p:txBody>
       </p:sp>
-      <p:sp>
-        <p:nvSpPr>
-          <p:cNvPr id="134" name="Google Shape;134;g87d40b54cd_0_119"/>
-          <p:cNvSpPr txBox="1">
-            <a:spLocks noGrp="1"/>
-          </p:cNvSpPr>
-          <p:nvPr>
-            <p:ph type="body" idx="1"/>
-          </p:nvPr>
-        </p:nvSpPr>
-        <p:spPr>
-          <a:xfrm>
-            <a:off x="415600" y="1536633"/>
-            <a:ext cx="11360700" cy="4555200"/>
-          </a:xfrm>
-          <a:prstGeom prst="rect">
-            <a:avLst/>
-          </a:prstGeom>
-        </p:spPr>
-        <p:txBody>
-          <a:bodyPr spcFirstLastPara="1" wrap="square" lIns="91425" tIns="45700" rIns="91425" bIns="45700" anchor="t" anchorCtr="0">
-            <a:noAutofit/>
-          </a:bodyPr>
-          <a:lstStyle/>
-          <a:p>
-            <a:pPr marL="0" lvl="0" indent="0" algn="l" rtl="0">
-              <a:lnSpc>
-                <a:spcPct val="115000"/>
-              </a:lnSpc>
-              <a:spcBef>
-                <a:spcPts val="0"/>
-              </a:spcBef>
-              <a:spcAft>
-                <a:spcPts val="0"/>
-              </a:spcAft>
-              <a:buClr>
-                <a:schemeClr val="dk1"/>
-              </a:buClr>
-              <a:buSzPts val="1100"/>
-              <a:buFont typeface="Arial"/>
-              <a:buNone/>
-            </a:pPr>
-            <a:r>
-              <a:rPr lang="en-US" dirty="0">
-                <a:highlight>
-                  <a:srgbClr val="FFFFFF"/>
-                </a:highlight>
-                <a:latin typeface="Arial"/>
-                <a:ea typeface="Arial"/>
-                <a:cs typeface="Arial"/>
-                <a:sym typeface="Arial"/>
-              </a:rPr>
-              <a:t>The task of predicting the next word, given the words so far.</a:t>
-            </a:r>
-            <a:endParaRPr dirty="0">
-              <a:highlight>
-                <a:srgbClr val="FFFFFF"/>
-              </a:highlight>
-              <a:latin typeface="Arial"/>
-              <a:ea typeface="Arial"/>
-              <a:cs typeface="Arial"/>
-              <a:sym typeface="Arial"/>
-            </a:endParaRPr>
-          </a:p>
-          <a:p>
-            <a:pPr marL="0" lvl="0" indent="0" algn="l" rtl="0">
-              <a:spcBef>
-                <a:spcPts val="1000"/>
-              </a:spcBef>
-              <a:spcAft>
-                <a:spcPts val="0"/>
-              </a:spcAft>
-              <a:buNone/>
-            </a:pPr>
-            <a:r>
-              <a:rPr lang="en-US" dirty="0">
-                <a:highlight>
-                  <a:srgbClr val="FFFFFF"/>
-                </a:highlight>
-                <a:latin typeface="Arial"/>
-                <a:ea typeface="Arial"/>
-                <a:cs typeface="Arial"/>
-                <a:sym typeface="Arial"/>
-              </a:rPr>
-              <a:t> </a:t>
-            </a:r>
-            <a:r>
-              <a:rPr lang="en-US" b="1" u="sng" dirty="0">
-                <a:highlight>
-                  <a:srgbClr val="FFFFFF"/>
-                </a:highlight>
-                <a:latin typeface="Arial"/>
-                <a:ea typeface="Arial"/>
-                <a:cs typeface="Arial"/>
-                <a:sym typeface="Arial"/>
-              </a:rPr>
-              <a:t>Goal:</a:t>
-            </a:r>
-            <a:r>
-              <a:rPr lang="en-US" dirty="0">
-                <a:highlight>
-                  <a:srgbClr val="FFFFFF"/>
-                </a:highlight>
-                <a:latin typeface="Arial"/>
-                <a:ea typeface="Arial"/>
-                <a:cs typeface="Arial"/>
-                <a:sym typeface="Arial"/>
-              </a:rPr>
-              <a:t> To estimate the probability of a word sequence</a:t>
-            </a:r>
-            <a:endParaRPr dirty="0">
-              <a:highlight>
-                <a:srgbClr val="FFFFFF"/>
-              </a:highlight>
-              <a:latin typeface="Arial"/>
-              <a:ea typeface="Arial"/>
-              <a:cs typeface="Arial"/>
-              <a:sym typeface="Arial"/>
-            </a:endParaRPr>
-          </a:p>
-          <a:p>
-            <a:pPr marL="0" lvl="0" indent="0" algn="l" rtl="0">
-              <a:spcBef>
-                <a:spcPts val="1000"/>
-              </a:spcBef>
-              <a:spcAft>
-                <a:spcPts val="0"/>
-              </a:spcAft>
-              <a:buNone/>
-            </a:pPr>
-            <a:endParaRPr dirty="0">
-              <a:highlight>
-                <a:srgbClr val="FFFFFF"/>
-              </a:highlight>
-              <a:latin typeface="Arial"/>
-              <a:ea typeface="Arial"/>
-              <a:cs typeface="Arial"/>
-              <a:sym typeface="Arial"/>
-            </a:endParaRPr>
-          </a:p>
-          <a:p>
-            <a:pPr marL="0" lvl="0" indent="0" algn="l" rtl="0">
-              <a:spcBef>
-                <a:spcPts val="1000"/>
-              </a:spcBef>
-              <a:spcAft>
-                <a:spcPts val="0"/>
-              </a:spcAft>
-              <a:buNone/>
-            </a:pPr>
-            <a:endParaRPr lang="en-US" dirty="0">
-              <a:highlight>
-                <a:srgbClr val="FFFFFF"/>
-              </a:highlight>
-              <a:latin typeface="Arial"/>
-              <a:ea typeface="Arial"/>
-              <a:cs typeface="Arial"/>
-              <a:sym typeface="Arial"/>
-            </a:endParaRPr>
-          </a:p>
-          <a:p>
-            <a:pPr marL="0" lvl="0" indent="0" algn="l" rtl="0">
-              <a:spcBef>
-                <a:spcPts val="1000"/>
-              </a:spcBef>
-              <a:spcAft>
-                <a:spcPts val="0"/>
-              </a:spcAft>
-              <a:buNone/>
-            </a:pPr>
-            <a:r>
-              <a:rPr lang="en-US" dirty="0">
-                <a:highlight>
-                  <a:srgbClr val="FFFFFF"/>
-                </a:highlight>
-                <a:latin typeface="Arial"/>
-                <a:ea typeface="Arial"/>
-                <a:cs typeface="Arial"/>
-                <a:sym typeface="Arial"/>
-              </a:rPr>
-              <a:t>Earlier models (N-gram models): </a:t>
-            </a:r>
-            <a:endParaRPr dirty="0">
-              <a:highlight>
-                <a:srgbClr val="FFFFFF"/>
-              </a:highlight>
-              <a:latin typeface="Arial"/>
-              <a:ea typeface="Arial"/>
-              <a:cs typeface="Arial"/>
-              <a:sym typeface="Arial"/>
-            </a:endParaRPr>
-          </a:p>
-          <a:p>
-            <a:pPr marL="0" lvl="0" indent="0" algn="l" rtl="0">
-              <a:lnSpc>
-                <a:spcPct val="115000"/>
-              </a:lnSpc>
-              <a:spcBef>
-                <a:spcPts val="0"/>
-              </a:spcBef>
-              <a:spcAft>
-                <a:spcPts val="0"/>
-              </a:spcAft>
-              <a:buClr>
-                <a:schemeClr val="dk1"/>
-              </a:buClr>
-              <a:buSzPts val="1100"/>
-              <a:buFont typeface="Arial"/>
-              <a:buNone/>
-            </a:pPr>
-            <a:r>
-              <a:rPr lang="en-US" dirty="0">
-                <a:highlight>
-                  <a:srgbClr val="FFFFFF"/>
-                </a:highlight>
-                <a:latin typeface="Arial"/>
-                <a:ea typeface="Arial"/>
-                <a:cs typeface="Arial"/>
-                <a:sym typeface="Arial"/>
-              </a:rPr>
-              <a:t>Probability is conditioned on a window of (n-1) previous words</a:t>
-            </a:r>
-            <a:endParaRPr dirty="0">
-              <a:highlight>
-                <a:srgbClr val="FFFFFF"/>
-              </a:highlight>
-              <a:latin typeface="Arial"/>
-              <a:ea typeface="Arial"/>
-              <a:cs typeface="Arial"/>
-              <a:sym typeface="Arial"/>
-            </a:endParaRPr>
-          </a:p>
-          <a:p>
-            <a:pPr marL="0" lvl="0" indent="0" algn="l" rtl="0">
-              <a:lnSpc>
-                <a:spcPct val="115000"/>
-              </a:lnSpc>
-              <a:spcBef>
-                <a:spcPts val="0"/>
-              </a:spcBef>
-              <a:spcAft>
-                <a:spcPts val="0"/>
-              </a:spcAft>
-              <a:buClr>
-                <a:schemeClr val="dk1"/>
-              </a:buClr>
-              <a:buSzPts val="1100"/>
-              <a:buFont typeface="Arial"/>
-              <a:buNone/>
-            </a:pPr>
-            <a:r>
-              <a:rPr lang="en-US" dirty="0">
-                <a:highlight>
-                  <a:srgbClr val="FFFFFF"/>
-                </a:highlight>
-                <a:latin typeface="Arial"/>
-                <a:ea typeface="Arial"/>
-                <a:cs typeface="Arial"/>
-                <a:sym typeface="Arial"/>
-              </a:rPr>
-              <a:t>Estimate the probability based on the training data</a:t>
-            </a:r>
-            <a:endParaRPr dirty="0">
-              <a:highlight>
-                <a:srgbClr val="FFFFFF"/>
-              </a:highlight>
-              <a:latin typeface="Arial"/>
-              <a:ea typeface="Arial"/>
-              <a:cs typeface="Arial"/>
-              <a:sym typeface="Arial"/>
-            </a:endParaRPr>
-          </a:p>
-          <a:p>
-            <a:pPr marL="0" lvl="0" indent="0" algn="l" rtl="0">
-              <a:spcBef>
-                <a:spcPts val="1000"/>
-              </a:spcBef>
-              <a:spcAft>
-                <a:spcPts val="0"/>
-              </a:spcAft>
-              <a:buNone/>
-            </a:pPr>
-            <a:endParaRPr dirty="0">
-              <a:highlight>
-                <a:srgbClr val="FFFFFF"/>
-              </a:highlight>
-              <a:latin typeface="Arial"/>
-              <a:ea typeface="Arial"/>
-              <a:cs typeface="Arial"/>
-              <a:sym typeface="Arial"/>
-            </a:endParaRPr>
-          </a:p>
-        </p:txBody>
-      </p:sp>
-      <p:pic>
-        <p:nvPicPr>
-          <p:cNvPr id="135" name="Google Shape;135;g87d40b54cd_0_119"/>
-          <p:cNvPicPr preferRelativeResize="0"/>
-          <p:nvPr/>
-        </p:nvPicPr>
-        <p:blipFill>
-          <a:blip r:embed="rId3">
-            <a:alphaModFix/>
-          </a:blip>
-          <a:stretch>
-            <a:fillRect/>
-          </a:stretch>
-        </p:blipFill>
-        <p:spPr>
-          <a:xfrm>
-            <a:off x="3310202" y="5159148"/>
-            <a:ext cx="4601808" cy="1105485"/>
-          </a:xfrm>
-          <a:prstGeom prst="rect">
-            <a:avLst/>
-          </a:prstGeom>
-          <a:noFill/>
-          <a:ln>
-            <a:noFill/>
-          </a:ln>
-        </p:spPr>
-      </p:pic>
+      <mc:AlternateContent xmlns:mc="http://schemas.openxmlformats.org/markup-compatibility/2006">
+        <mc:Choice xmlns:a14="http://schemas.microsoft.com/office/drawing/2010/main" Requires="a14">
+          <p:sp>
+            <p:nvSpPr>
+              <p:cNvPr id="134" name="Google Shape;134;g87d40b54cd_0_119"/>
+              <p:cNvSpPr txBox="1">
+                <a:spLocks noGrp="1"/>
+              </p:cNvSpPr>
+              <p:nvPr>
+                <p:ph type="body" idx="1"/>
+              </p:nvPr>
+            </p:nvSpPr>
+            <p:spPr>
+              <a:xfrm>
+                <a:off x="415600" y="1536633"/>
+                <a:ext cx="11360700" cy="4555200"/>
+              </a:xfrm>
+              <a:prstGeom prst="rect">
+                <a:avLst/>
+              </a:prstGeom>
+            </p:spPr>
+            <p:txBody>
+              <a:bodyPr spcFirstLastPara="1" wrap="square" lIns="91425" tIns="45700" rIns="91425" bIns="45700" anchor="t" anchorCtr="0">
+                <a:noAutofit/>
+              </a:bodyPr>
+              <a:lstStyle/>
+              <a:p>
+                <a:pPr marL="0" lvl="0" indent="0" algn="l" rtl="0">
+                  <a:lnSpc>
+                    <a:spcPct val="115000"/>
+                  </a:lnSpc>
+                  <a:spcBef>
+                    <a:spcPts val="0"/>
+                  </a:spcBef>
+                  <a:spcAft>
+                    <a:spcPts val="0"/>
+                  </a:spcAft>
+                  <a:buClr>
+                    <a:schemeClr val="dk1"/>
+                  </a:buClr>
+                  <a:buSzPts val="1100"/>
+                  <a:buFont typeface="Arial"/>
+                  <a:buNone/>
+                </a:pPr>
+                <a:r>
+                  <a:rPr lang="en-US" dirty="0">
+                    <a:highlight>
+                      <a:srgbClr val="FFFFFF"/>
+                    </a:highlight>
+                    <a:latin typeface="Arial"/>
+                    <a:ea typeface="Arial"/>
+                    <a:cs typeface="Arial"/>
+                    <a:sym typeface="Arial"/>
+                  </a:rPr>
+                  <a:t>The task of predicting the next word, given the words so far.</a:t>
+                </a:r>
+              </a:p>
+              <a:p>
+                <a:pPr marL="0" lvl="0" indent="0" algn="l" rtl="0">
+                  <a:spcBef>
+                    <a:spcPts val="1000"/>
+                  </a:spcBef>
+                  <a:spcAft>
+                    <a:spcPts val="0"/>
+                  </a:spcAft>
+                  <a:buNone/>
+                </a:pPr>
+                <a:r>
+                  <a:rPr lang="en-US" dirty="0">
+                    <a:highlight>
+                      <a:srgbClr val="FFFFFF"/>
+                    </a:highlight>
+                    <a:latin typeface="Arial"/>
+                    <a:ea typeface="Arial"/>
+                    <a:cs typeface="Arial"/>
+                    <a:sym typeface="Arial"/>
+                  </a:rPr>
+                  <a:t> </a:t>
+                </a:r>
+                <a:r>
+                  <a:rPr lang="en-US" b="1" u="sng" dirty="0">
+                    <a:highlight>
+                      <a:srgbClr val="FFFFFF"/>
+                    </a:highlight>
+                    <a:latin typeface="Arial"/>
+                    <a:ea typeface="Arial"/>
+                    <a:cs typeface="Arial"/>
+                    <a:sym typeface="Arial"/>
+                  </a:rPr>
+                  <a:t>Goal:</a:t>
+                </a:r>
+                <a:r>
+                  <a:rPr lang="en-US" dirty="0">
+                    <a:highlight>
+                      <a:srgbClr val="FFFFFF"/>
+                    </a:highlight>
+                    <a:latin typeface="Arial"/>
+                    <a:ea typeface="Arial"/>
+                    <a:cs typeface="Arial"/>
+                    <a:sym typeface="Arial"/>
+                  </a:rPr>
+                  <a:t> To estimate the probability of a word sequence</a:t>
+                </a:r>
+              </a:p>
+              <a:p>
+                <a:pPr marL="0" lvl="0" indent="0" algn="l" rtl="0">
+                  <a:spcBef>
+                    <a:spcPts val="1000"/>
+                  </a:spcBef>
+                  <a:spcAft>
+                    <a:spcPts val="0"/>
+                  </a:spcAft>
+                  <a:buNone/>
+                </a:pPr>
+                <a:endParaRPr lang="en-US" dirty="0">
+                  <a:highlight>
+                    <a:srgbClr val="FFFFFF"/>
+                  </a:highlight>
+                  <a:latin typeface="Arial"/>
+                  <a:ea typeface="Arial"/>
+                  <a:cs typeface="Arial"/>
+                  <a:sym typeface="Arial"/>
+                </a:endParaRPr>
+              </a:p>
+              <a:p>
+                <a:pPr marL="0" lvl="0" indent="0" algn="l" rtl="0">
+                  <a:spcBef>
+                    <a:spcPts val="1000"/>
+                  </a:spcBef>
+                  <a:spcAft>
+                    <a:spcPts val="0"/>
+                  </a:spcAft>
+                  <a:buNone/>
+                </a:pPr>
+                <a:endParaRPr lang="en-US" dirty="0">
+                  <a:highlight>
+                    <a:srgbClr val="FFFFFF"/>
+                  </a:highlight>
+                  <a:latin typeface="Arial"/>
+                  <a:ea typeface="Arial"/>
+                  <a:cs typeface="Arial"/>
+                  <a:sym typeface="Arial"/>
+                </a:endParaRPr>
+              </a:p>
+              <a:p>
+                <a:pPr marL="0" lvl="0" indent="0" algn="l" rtl="0">
+                  <a:spcBef>
+                    <a:spcPts val="1000"/>
+                  </a:spcBef>
+                  <a:spcAft>
+                    <a:spcPts val="0"/>
+                  </a:spcAft>
+                  <a:buNone/>
+                </a:pPr>
+                <a:r>
+                  <a:rPr lang="en-US" dirty="0">
+                    <a:highlight>
+                      <a:srgbClr val="FFFFFF"/>
+                    </a:highlight>
+                    <a:latin typeface="Arial"/>
+                    <a:ea typeface="Arial"/>
+                    <a:cs typeface="Arial"/>
+                    <a:sym typeface="Arial"/>
+                  </a:rPr>
+                  <a:t>Earlier models (N-gram models): </a:t>
+                </a:r>
+              </a:p>
+              <a:p>
+                <a:pPr marL="0" lvl="0" indent="0" algn="l" rtl="0">
+                  <a:lnSpc>
+                    <a:spcPct val="115000"/>
+                  </a:lnSpc>
+                  <a:spcBef>
+                    <a:spcPts val="0"/>
+                  </a:spcBef>
+                  <a:spcAft>
+                    <a:spcPts val="0"/>
+                  </a:spcAft>
+                  <a:buClr>
+                    <a:schemeClr val="dk1"/>
+                  </a:buClr>
+                  <a:buSzPts val="1100"/>
+                  <a:buFont typeface="Arial"/>
+                  <a:buNone/>
+                </a:pPr>
+                <a:r>
+                  <a:rPr lang="en-US" dirty="0">
+                    <a:highlight>
+                      <a:srgbClr val="FFFFFF"/>
+                    </a:highlight>
+                    <a:latin typeface="Arial"/>
+                    <a:ea typeface="Arial"/>
+                    <a:cs typeface="Arial"/>
+                    <a:sym typeface="Arial"/>
+                  </a:rPr>
+                  <a:t>Probability is conditioned on a window of (n-1) previous words</a:t>
+                </a:r>
+              </a:p>
+              <a:p>
+                <a:pPr marL="0" lvl="0" indent="0" algn="l" rtl="0">
+                  <a:lnSpc>
+                    <a:spcPct val="115000"/>
+                  </a:lnSpc>
+                  <a:spcBef>
+                    <a:spcPts val="0"/>
+                  </a:spcBef>
+                  <a:spcAft>
+                    <a:spcPts val="0"/>
+                  </a:spcAft>
+                  <a:buClr>
+                    <a:schemeClr val="dk1"/>
+                  </a:buClr>
+                  <a:buSzPts val="1100"/>
+                  <a:buFont typeface="Arial"/>
+                  <a:buNone/>
+                </a:pPr>
+                <a:r>
+                  <a:rPr lang="en-US" dirty="0">
+                    <a:highlight>
+                      <a:srgbClr val="FFFFFF"/>
+                    </a:highlight>
+                    <a:latin typeface="Arial"/>
+                    <a:ea typeface="Arial"/>
+                    <a:cs typeface="Arial"/>
+                    <a:sym typeface="Arial"/>
+                  </a:rPr>
+                  <a:t>Estimate the probability based on the training data </a:t>
+                </a:r>
+              </a:p>
+              <a:p>
+                <a:pPr marL="0" lvl="0" indent="0" algn="l" rtl="0">
+                  <a:lnSpc>
+                    <a:spcPct val="115000"/>
+                  </a:lnSpc>
+                  <a:spcBef>
+                    <a:spcPts val="0"/>
+                  </a:spcBef>
+                  <a:spcAft>
+                    <a:spcPts val="0"/>
+                  </a:spcAft>
+                  <a:buClr>
+                    <a:schemeClr val="dk1"/>
+                  </a:buClr>
+                  <a:buSzPts val="1100"/>
+                  <a:buFont typeface="Arial"/>
+                  <a:buNone/>
+                </a:pPr>
+                <a14:m>
+                  <m:oMathPara xmlns:m="http://schemas.openxmlformats.org/officeDocument/2006/math">
+                    <m:oMathParaPr>
+                      <m:jc m:val="centerGroup"/>
+                    </m:oMathParaPr>
+                    <m:oMath xmlns:m="http://schemas.openxmlformats.org/officeDocument/2006/math">
+                      <m:r>
+                        <a:rPr lang="en-US" b="0" i="1" smtClean="0">
+                          <a:highlight>
+                            <a:srgbClr val="FFFFFF"/>
+                          </a:highlight>
+                          <a:latin typeface="Cambria Math" panose="02040503050406030204" pitchFamily="18" charset="0"/>
+                          <a:ea typeface="Arial"/>
+                          <a:cs typeface="Arial"/>
+                          <a:sym typeface="Arial"/>
+                        </a:rPr>
+                        <m:t>𝑃</m:t>
+                      </m:r>
+                      <m:d>
+                        <m:dPr>
+                          <m:ctrlPr>
+                            <a:rPr lang="en-US" b="0" i="1" smtClean="0">
+                              <a:highlight>
+                                <a:srgbClr val="FFFFFF"/>
+                              </a:highlight>
+                              <a:latin typeface="Cambria Math" panose="02040503050406030204" pitchFamily="18" charset="0"/>
+                              <a:ea typeface="Arial"/>
+                              <a:cs typeface="Arial"/>
+                              <a:sym typeface="Arial"/>
+                            </a:rPr>
+                          </m:ctrlPr>
+                        </m:dPr>
+                        <m:e>
+                          <m:r>
+                            <a:rPr lang="en-US" b="0" i="1" smtClean="0">
+                              <a:highlight>
+                                <a:srgbClr val="FFFFFF"/>
+                              </a:highlight>
+                              <a:latin typeface="Cambria Math" panose="02040503050406030204" pitchFamily="18" charset="0"/>
+                              <a:ea typeface="Arial"/>
+                              <a:cs typeface="Arial"/>
+                              <a:sym typeface="Arial"/>
+                            </a:rPr>
+                            <m:t>𝑏𝑒𝑎𝑐h</m:t>
+                          </m:r>
+                        </m:e>
+                        <m:e>
+                          <m:r>
+                            <a:rPr lang="en-US" b="0" i="1" smtClean="0">
+                              <a:highlight>
+                                <a:srgbClr val="FFFFFF"/>
+                              </a:highlight>
+                              <a:latin typeface="Cambria Math" panose="02040503050406030204" pitchFamily="18" charset="0"/>
+                              <a:ea typeface="Arial"/>
+                              <a:cs typeface="Arial"/>
+                              <a:sym typeface="Arial"/>
+                            </a:rPr>
+                            <m:t>𝑛𝑖𝑐𝑒</m:t>
+                          </m:r>
+                        </m:e>
+                      </m:d>
+                      <m:r>
+                        <a:rPr lang="en-US" b="0" i="1" smtClean="0">
+                          <a:highlight>
+                            <a:srgbClr val="FFFFFF"/>
+                          </a:highlight>
+                          <a:latin typeface="Cambria Math" panose="02040503050406030204" pitchFamily="18" charset="0"/>
+                          <a:ea typeface="Arial"/>
+                          <a:cs typeface="Arial"/>
+                          <a:sym typeface="Arial"/>
+                        </a:rPr>
+                        <m:t>=</m:t>
+                      </m:r>
+                      <m:f>
+                        <m:fPr>
+                          <m:ctrlPr>
+                            <a:rPr lang="en-US" b="0" i="1" smtClean="0">
+                              <a:highlight>
+                                <a:srgbClr val="FFFFFF"/>
+                              </a:highlight>
+                              <a:latin typeface="Cambria Math" panose="02040503050406030204" pitchFamily="18" charset="0"/>
+                              <a:cs typeface="Arial"/>
+                              <a:sym typeface="Arial"/>
+                            </a:rPr>
+                          </m:ctrlPr>
+                        </m:fPr>
+                        <m:num>
+                          <m:r>
+                            <a:rPr lang="en-US" b="0" i="1" smtClean="0">
+                              <a:highlight>
+                                <a:srgbClr val="FFFFFF"/>
+                              </a:highlight>
+                              <a:latin typeface="Cambria Math" panose="02040503050406030204" pitchFamily="18" charset="0"/>
+                              <a:cs typeface="Arial"/>
+                              <a:sym typeface="Arial"/>
+                            </a:rPr>
+                            <m:t>𝑃</m:t>
+                          </m:r>
+                          <m:r>
+                            <a:rPr lang="en-US" b="0" i="1" smtClean="0">
+                              <a:highlight>
+                                <a:srgbClr val="FFFFFF"/>
+                              </a:highlight>
+                              <a:latin typeface="Cambria Math" panose="02040503050406030204" pitchFamily="18" charset="0"/>
+                              <a:cs typeface="Arial"/>
+                              <a:sym typeface="Arial"/>
+                            </a:rPr>
+                            <m:t>(</m:t>
+                          </m:r>
+                          <m:r>
+                            <a:rPr lang="en-US" b="0" i="1" smtClean="0">
+                              <a:highlight>
+                                <a:srgbClr val="FFFFFF"/>
+                              </a:highlight>
+                              <a:latin typeface="Cambria Math" panose="02040503050406030204" pitchFamily="18" charset="0"/>
+                              <a:cs typeface="Arial"/>
+                              <a:sym typeface="Arial"/>
+                            </a:rPr>
+                            <m:t>𝑛𝑖𝑐𝑒</m:t>
+                          </m:r>
+                          <m:r>
+                            <a:rPr lang="en-US" b="0" i="1" smtClean="0">
+                              <a:highlight>
+                                <a:srgbClr val="FFFFFF"/>
+                              </a:highlight>
+                              <a:latin typeface="Cambria Math" panose="02040503050406030204" pitchFamily="18" charset="0"/>
+                              <a:cs typeface="Arial"/>
+                              <a:sym typeface="Arial"/>
+                            </a:rPr>
+                            <m:t> </m:t>
+                          </m:r>
+                          <m:r>
+                            <a:rPr lang="en-US" b="0" i="1" smtClean="0">
+                              <a:highlight>
+                                <a:srgbClr val="FFFFFF"/>
+                              </a:highlight>
+                              <a:latin typeface="Cambria Math" panose="02040503050406030204" pitchFamily="18" charset="0"/>
+                              <a:cs typeface="Arial"/>
+                              <a:sym typeface="Arial"/>
+                            </a:rPr>
+                            <m:t>𝑏𝑒𝑎𝑐h</m:t>
+                          </m:r>
+                          <m:r>
+                            <a:rPr lang="en-US" b="0" i="1" smtClean="0">
+                              <a:highlight>
+                                <a:srgbClr val="FFFFFF"/>
+                              </a:highlight>
+                              <a:latin typeface="Cambria Math" panose="02040503050406030204" pitchFamily="18" charset="0"/>
+                              <a:cs typeface="Arial"/>
+                              <a:sym typeface="Arial"/>
+                            </a:rPr>
+                            <m:t>)</m:t>
+                          </m:r>
+                        </m:num>
+                        <m:den>
+                          <m:r>
+                            <a:rPr lang="en-US" b="0" i="1" smtClean="0">
+                              <a:highlight>
+                                <a:srgbClr val="FFFFFF"/>
+                              </a:highlight>
+                              <a:latin typeface="Cambria Math" panose="02040503050406030204" pitchFamily="18" charset="0"/>
+                              <a:cs typeface="Arial"/>
+                              <a:sym typeface="Arial"/>
+                            </a:rPr>
+                            <m:t>𝑃</m:t>
+                          </m:r>
+                          <m:r>
+                            <a:rPr lang="en-US" b="0" i="1" smtClean="0">
+                              <a:highlight>
+                                <a:srgbClr val="FFFFFF"/>
+                              </a:highlight>
+                              <a:latin typeface="Cambria Math" panose="02040503050406030204" pitchFamily="18" charset="0"/>
+                              <a:cs typeface="Arial"/>
+                              <a:sym typeface="Arial"/>
+                            </a:rPr>
+                            <m:t>(</m:t>
+                          </m:r>
+                          <m:r>
+                            <a:rPr lang="en-US" b="0" i="1" smtClean="0">
+                              <a:highlight>
+                                <a:srgbClr val="FFFFFF"/>
+                              </a:highlight>
+                              <a:latin typeface="Cambria Math" panose="02040503050406030204" pitchFamily="18" charset="0"/>
+                              <a:cs typeface="Arial"/>
+                              <a:sym typeface="Arial"/>
+                            </a:rPr>
+                            <m:t>𝑛𝑖𝑐𝑒</m:t>
+                          </m:r>
+                          <m:r>
+                            <a:rPr lang="en-US" b="0" i="1" smtClean="0">
+                              <a:highlight>
+                                <a:srgbClr val="FFFFFF"/>
+                              </a:highlight>
+                              <a:latin typeface="Cambria Math" panose="02040503050406030204" pitchFamily="18" charset="0"/>
+                              <a:cs typeface="Arial"/>
+                              <a:sym typeface="Arial"/>
+                            </a:rPr>
+                            <m:t>)</m:t>
+                          </m:r>
+                        </m:den>
+                      </m:f>
+                    </m:oMath>
+                  </m:oMathPara>
+                </a14:m>
+                <a:endParaRPr lang="en-US" dirty="0">
+                  <a:highlight>
+                    <a:srgbClr val="FFFFFF"/>
+                  </a:highlight>
+                  <a:latin typeface="Arial"/>
+                  <a:ea typeface="Arial"/>
+                  <a:cs typeface="Arial"/>
+                  <a:sym typeface="Arial"/>
+                </a:endParaRPr>
+              </a:p>
+              <a:p>
+                <a:pPr marL="0" lvl="0" indent="0" algn="l" rtl="0">
+                  <a:spcBef>
+                    <a:spcPts val="1000"/>
+                  </a:spcBef>
+                  <a:spcAft>
+                    <a:spcPts val="0"/>
+                  </a:spcAft>
+                  <a:buNone/>
+                </a:pPr>
+                <a:endParaRPr dirty="0">
+                  <a:highlight>
+                    <a:srgbClr val="FFFFFF"/>
+                  </a:highlight>
+                  <a:latin typeface="Arial"/>
+                  <a:ea typeface="Arial"/>
+                  <a:cs typeface="Arial"/>
+                  <a:sym typeface="Arial"/>
+                </a:endParaRPr>
+              </a:p>
+            </p:txBody>
+          </p:sp>
+        </mc:Choice>
+        <mc:Fallback>
+          <p:sp>
+            <p:nvSpPr>
+              <p:cNvPr id="134" name="Google Shape;134;g87d40b54cd_0_119"/>
+              <p:cNvSpPr txBox="1">
+                <a:spLocks noGrp="1" noRot="1" noChangeAspect="1" noMove="1" noResize="1" noEditPoints="1" noAdjustHandles="1" noChangeArrowheads="1" noChangeShapeType="1" noTextEdit="1"/>
+              </p:cNvSpPr>
+              <p:nvPr>
+                <p:ph type="body" idx="1"/>
+              </p:nvPr>
+            </p:nvSpPr>
+            <p:spPr>
+              <a:xfrm>
+                <a:off x="415600" y="1536633"/>
+                <a:ext cx="11360700" cy="4555200"/>
+              </a:xfrm>
+              <a:prstGeom prst="rect">
+                <a:avLst/>
+              </a:prstGeom>
+              <a:blipFill>
+                <a:blip r:embed="rId3"/>
+                <a:stretch>
+                  <a:fillRect l="-1073" t="-937" b="-803"/>
+                </a:stretch>
+              </a:blipFill>
+            </p:spPr>
+            <p:txBody>
+              <a:bodyPr/>
+              <a:lstStyle/>
+              <a:p>
+                <a:r>
+                  <a:rPr lang="en-US">
+                    <a:noFill/>
+                  </a:rPr>
+                  <a:t> </a:t>
+                </a:r>
+              </a:p>
+            </p:txBody>
+          </p:sp>
+        </mc:Fallback>
+      </mc:AlternateContent>
       <p:pic>
         <p:nvPicPr>
           <p:cNvPr id="136" name="Google Shape;136;g87d40b54cd_0_119"/>
@@ -28697,7 +29022,7 @@
                 <a:cs typeface="+mn-cs"/>
                 <a:sym typeface="Arial"/>
               </a:rPr>
-              <a:t>If the input layer (or hidden layer) of the related words(cat and dog) are close and  P(</a:t>
+              <a:t>If the input layer (or hidden layer) of two related words(cat and dog) are close and  P(</a:t>
             </a:r>
             <a:r>
               <a:rPr lang="en-US" sz="2400" kern="1200" dirty="0" err="1">

</xml_diff>